<commit_message>
re #1 -- minor clean up on processing page
</commit_message>
<xml_diff>
--- a/src/assets/graphics.pptx
+++ b/src/assets/graphics.pptx
@@ -6,6 +6,7 @@
   </p:sldMasterIdLst>
   <p:sldIdLst>
     <p:sldId id="256" r:id="rId2"/>
+    <p:sldId id="257" r:id="rId3"/>
   </p:sldIdLst>
   <p:sldSz cx="12192000" cy="6858000"/>
   <p:notesSz cx="6858000" cy="9144000"/>
@@ -104,6 +105,11 @@
       </a:defRPr>
     </a:lvl9pPr>
   </p:defaultTextStyle>
+  <p:extLst>
+    <p:ext uri="{EFAFB233-063F-42B5-8137-9DF3F51BA10A}">
+      <p15:sldGuideLst xmlns:p15="http://schemas.microsoft.com/office/powerpoint/2012/main"/>
+    </p:ext>
+  </p:extLst>
 </p:presentation>
 </file>
 
@@ -254,7 +260,7 @@
           <a:p>
             <a:fld id="{53F0AC85-51B6-E44A-8F4A-F07DD4B8EC8E}" type="datetimeFigureOut">
               <a:rPr lang="en-US" smtClean="0"/>
-              <a:t>4/15/22</a:t>
+              <a:t>4/29/22</a:t>
             </a:fld>
             <a:endParaRPr lang="en-US"/>
           </a:p>
@@ -452,7 +458,7 @@
           <a:p>
             <a:fld id="{53F0AC85-51B6-E44A-8F4A-F07DD4B8EC8E}" type="datetimeFigureOut">
               <a:rPr lang="en-US" smtClean="0"/>
-              <a:t>4/15/22</a:t>
+              <a:t>4/29/22</a:t>
             </a:fld>
             <a:endParaRPr lang="en-US"/>
           </a:p>
@@ -660,7 +666,7 @@
           <a:p>
             <a:fld id="{53F0AC85-51B6-E44A-8F4A-F07DD4B8EC8E}" type="datetimeFigureOut">
               <a:rPr lang="en-US" smtClean="0"/>
-              <a:t>4/15/22</a:t>
+              <a:t>4/29/22</a:t>
             </a:fld>
             <a:endParaRPr lang="en-US"/>
           </a:p>
@@ -858,7 +864,7 @@
           <a:p>
             <a:fld id="{53F0AC85-51B6-E44A-8F4A-F07DD4B8EC8E}" type="datetimeFigureOut">
               <a:rPr lang="en-US" smtClean="0"/>
-              <a:t>4/15/22</a:t>
+              <a:t>4/29/22</a:t>
             </a:fld>
             <a:endParaRPr lang="en-US"/>
           </a:p>
@@ -1133,7 +1139,7 @@
           <a:p>
             <a:fld id="{53F0AC85-51B6-E44A-8F4A-F07DD4B8EC8E}" type="datetimeFigureOut">
               <a:rPr lang="en-US" smtClean="0"/>
-              <a:t>4/15/22</a:t>
+              <a:t>4/29/22</a:t>
             </a:fld>
             <a:endParaRPr lang="en-US"/>
           </a:p>
@@ -1398,7 +1404,7 @@
           <a:p>
             <a:fld id="{53F0AC85-51B6-E44A-8F4A-F07DD4B8EC8E}" type="datetimeFigureOut">
               <a:rPr lang="en-US" smtClean="0"/>
-              <a:t>4/15/22</a:t>
+              <a:t>4/29/22</a:t>
             </a:fld>
             <a:endParaRPr lang="en-US"/>
           </a:p>
@@ -1810,7 +1816,7 @@
           <a:p>
             <a:fld id="{53F0AC85-51B6-E44A-8F4A-F07DD4B8EC8E}" type="datetimeFigureOut">
               <a:rPr lang="en-US" smtClean="0"/>
-              <a:t>4/15/22</a:t>
+              <a:t>4/29/22</a:t>
             </a:fld>
             <a:endParaRPr lang="en-US"/>
           </a:p>
@@ -1951,7 +1957,7 @@
           <a:p>
             <a:fld id="{53F0AC85-51B6-E44A-8F4A-F07DD4B8EC8E}" type="datetimeFigureOut">
               <a:rPr lang="en-US" smtClean="0"/>
-              <a:t>4/15/22</a:t>
+              <a:t>4/29/22</a:t>
             </a:fld>
             <a:endParaRPr lang="en-US"/>
           </a:p>
@@ -2064,7 +2070,7 @@
           <a:p>
             <a:fld id="{53F0AC85-51B6-E44A-8F4A-F07DD4B8EC8E}" type="datetimeFigureOut">
               <a:rPr lang="en-US" smtClean="0"/>
-              <a:t>4/15/22</a:t>
+              <a:t>4/29/22</a:t>
             </a:fld>
             <a:endParaRPr lang="en-US"/>
           </a:p>
@@ -2375,7 +2381,7 @@
           <a:p>
             <a:fld id="{53F0AC85-51B6-E44A-8F4A-F07DD4B8EC8E}" type="datetimeFigureOut">
               <a:rPr lang="en-US" smtClean="0"/>
-              <a:t>4/15/22</a:t>
+              <a:t>4/29/22</a:t>
             </a:fld>
             <a:endParaRPr lang="en-US"/>
           </a:p>
@@ -2663,7 +2669,7 @@
           <a:p>
             <a:fld id="{53F0AC85-51B6-E44A-8F4A-F07DD4B8EC8E}" type="datetimeFigureOut">
               <a:rPr lang="en-US" smtClean="0"/>
-              <a:t>4/15/22</a:t>
+              <a:t>4/29/22</a:t>
             </a:fld>
             <a:endParaRPr lang="en-US"/>
           </a:p>
@@ -2904,7 +2910,7 @@
           <a:p>
             <a:fld id="{53F0AC85-51B6-E44A-8F4A-F07DD4B8EC8E}" type="datetimeFigureOut">
               <a:rPr lang="en-US" smtClean="0"/>
-              <a:t>4/15/22</a:t>
+              <a:t>4/29/22</a:t>
             </a:fld>
             <a:endParaRPr lang="en-US"/>
           </a:p>
@@ -4054,6 +4060,251 @@
 </p:sld>
 </file>
 
+<file path=ppt/slides/slide2.xml><?xml version="1.0" encoding="utf-8"?>
+<p:sld xmlns:a="http://schemas.openxmlformats.org/drawingml/2006/main" xmlns:r="http://schemas.openxmlformats.org/officeDocument/2006/relationships" xmlns:p="http://schemas.openxmlformats.org/presentationml/2006/main">
+  <p:cSld>
+    <p:spTree>
+      <p:nvGrpSpPr>
+        <p:cNvPr id="1" name=""/>
+        <p:cNvGrpSpPr/>
+        <p:nvPr/>
+      </p:nvGrpSpPr>
+      <p:grpSpPr>
+        <a:xfrm>
+          <a:off x="0" y="0"/>
+          <a:ext cx="0" cy="0"/>
+          <a:chOff x="0" y="0"/>
+          <a:chExt cx="0" cy="0"/>
+        </a:xfrm>
+      </p:grpSpPr>
+      <p:sp>
+        <p:nvSpPr>
+          <p:cNvPr id="4" name="Rectangle 3">
+            <a:extLst>
+              <a:ext uri="{FF2B5EF4-FFF2-40B4-BE49-F238E27FC236}">
+                <a16:creationId xmlns:a16="http://schemas.microsoft.com/office/drawing/2014/main" id="{F31DE79E-6F01-9D4E-A22E-7E785354E889}"/>
+              </a:ext>
+            </a:extLst>
+          </p:cNvPr>
+          <p:cNvSpPr/>
+          <p:nvPr/>
+        </p:nvSpPr>
+        <p:spPr>
+          <a:xfrm>
+            <a:off x="3324285" y="1774070"/>
+            <a:ext cx="1800000" cy="1800000"/>
+          </a:xfrm>
+          <a:prstGeom prst="rect">
+            <a:avLst/>
+          </a:prstGeom>
+          <a:noFill/>
+          <a:ln w="63500">
+            <a:solidFill>
+              <a:schemeClr val="tx1"/>
+            </a:solidFill>
+          </a:ln>
+        </p:spPr>
+        <p:style>
+          <a:lnRef idx="2">
+            <a:schemeClr val="accent1">
+              <a:shade val="50000"/>
+            </a:schemeClr>
+          </a:lnRef>
+          <a:fillRef idx="1">
+            <a:schemeClr val="accent1"/>
+          </a:fillRef>
+          <a:effectRef idx="0">
+            <a:schemeClr val="accent1"/>
+          </a:effectRef>
+          <a:fontRef idx="minor">
+            <a:schemeClr val="lt1"/>
+          </a:fontRef>
+        </p:style>
+        <p:txBody>
+          <a:bodyPr rtlCol="0" anchor="ctr"/>
+          <a:lstStyle/>
+          <a:p>
+            <a:pPr algn="ctr"/>
+            <a:endParaRPr lang="en-US"/>
+          </a:p>
+        </p:txBody>
+      </p:sp>
+      <p:sp>
+        <p:nvSpPr>
+          <p:cNvPr id="5" name="Oval 4">
+            <a:extLst>
+              <a:ext uri="{FF2B5EF4-FFF2-40B4-BE49-F238E27FC236}">
+                <a16:creationId xmlns:a16="http://schemas.microsoft.com/office/drawing/2014/main" id="{FBD2ECA8-B2BA-7D41-813E-8D5D3D837C5B}"/>
+              </a:ext>
+            </a:extLst>
+          </p:cNvPr>
+          <p:cNvSpPr/>
+          <p:nvPr/>
+        </p:nvSpPr>
+        <p:spPr>
+          <a:xfrm>
+            <a:off x="3504285" y="1954070"/>
+            <a:ext cx="1440000" cy="1440000"/>
+          </a:xfrm>
+          <a:prstGeom prst="ellipse">
+            <a:avLst/>
+          </a:prstGeom>
+          <a:noFill/>
+          <a:ln w="25400">
+            <a:solidFill>
+              <a:schemeClr val="tx1"/>
+            </a:solidFill>
+          </a:ln>
+        </p:spPr>
+        <p:style>
+          <a:lnRef idx="2">
+            <a:schemeClr val="accent1">
+              <a:shade val="50000"/>
+            </a:schemeClr>
+          </a:lnRef>
+          <a:fillRef idx="1">
+            <a:schemeClr val="accent1"/>
+          </a:fillRef>
+          <a:effectRef idx="0">
+            <a:schemeClr val="accent1"/>
+          </a:effectRef>
+          <a:fontRef idx="minor">
+            <a:schemeClr val="lt1"/>
+          </a:fontRef>
+        </p:style>
+        <p:txBody>
+          <a:bodyPr rtlCol="0" anchor="ctr"/>
+          <a:lstStyle/>
+          <a:p>
+            <a:pPr algn="ctr"/>
+            <a:endParaRPr lang="en-US"/>
+          </a:p>
+        </p:txBody>
+      </p:sp>
+      <p:pic>
+        <p:nvPicPr>
+          <p:cNvPr id="6" name="Graphic 5" descr="Leaf with solid fill">
+            <a:extLst>
+              <a:ext uri="{FF2B5EF4-FFF2-40B4-BE49-F238E27FC236}">
+                <a16:creationId xmlns:a16="http://schemas.microsoft.com/office/drawing/2014/main" id="{4A8A3478-59E7-2840-A940-E1F6E29DAD83}"/>
+              </a:ext>
+            </a:extLst>
+          </p:cNvPr>
+          <p:cNvPicPr>
+            <a:picLocks noChangeAspect="1"/>
+          </p:cNvPicPr>
+          <p:nvPr/>
+        </p:nvPicPr>
+        <p:blipFill>
+          <a:blip r:embed="rId2">
+            <a:extLst>
+              <a:ext uri="{96DAC541-7B7A-43D3-8B79-37D633B846F1}">
+                <asvg:svgBlip xmlns:asvg="http://schemas.microsoft.com/office/drawing/2016/SVG/main" r:embed="rId3"/>
+              </a:ext>
+            </a:extLst>
+          </a:blip>
+          <a:stretch>
+            <a:fillRect/>
+          </a:stretch>
+        </p:blipFill>
+        <p:spPr>
+          <a:xfrm>
+            <a:off x="3578425" y="2259299"/>
+            <a:ext cx="767571" cy="767571"/>
+          </a:xfrm>
+          <a:prstGeom prst="rect">
+            <a:avLst/>
+          </a:prstGeom>
+        </p:spPr>
+      </p:pic>
+      <p:pic>
+        <p:nvPicPr>
+          <p:cNvPr id="7" name="Graphic 6" descr="Leaf with solid fill">
+            <a:extLst>
+              <a:ext uri="{FF2B5EF4-FFF2-40B4-BE49-F238E27FC236}">
+                <a16:creationId xmlns:a16="http://schemas.microsoft.com/office/drawing/2014/main" id="{FE97B762-84E0-824D-A9F4-719D89D5B3F2}"/>
+              </a:ext>
+            </a:extLst>
+          </p:cNvPr>
+          <p:cNvPicPr>
+            <a:picLocks noChangeAspect="1"/>
+          </p:cNvPicPr>
+          <p:nvPr/>
+        </p:nvPicPr>
+        <p:blipFill>
+          <a:blip r:embed="rId2">
+            <a:extLst>
+              <a:ext uri="{96DAC541-7B7A-43D3-8B79-37D633B846F1}">
+                <asvg:svgBlip xmlns:asvg="http://schemas.microsoft.com/office/drawing/2016/SVG/main" r:embed="rId3"/>
+              </a:ext>
+            </a:extLst>
+          </a:blip>
+          <a:stretch>
+            <a:fillRect/>
+          </a:stretch>
+        </p:blipFill>
+        <p:spPr>
+          <a:xfrm>
+            <a:off x="4109765" y="2271655"/>
+            <a:ext cx="767571" cy="767571"/>
+          </a:xfrm>
+          <a:prstGeom prst="rect">
+            <a:avLst/>
+          </a:prstGeom>
+        </p:spPr>
+      </p:pic>
+      <p:sp>
+        <p:nvSpPr>
+          <p:cNvPr id="8" name="TextBox 7">
+            <a:extLst>
+              <a:ext uri="{FF2B5EF4-FFF2-40B4-BE49-F238E27FC236}">
+                <a16:creationId xmlns:a16="http://schemas.microsoft.com/office/drawing/2014/main" id="{919E926C-65BA-4F48-A560-81F52DA69DA6}"/>
+              </a:ext>
+            </a:extLst>
+          </p:cNvPr>
+          <p:cNvSpPr txBox="1"/>
+          <p:nvPr/>
+        </p:nvSpPr>
+        <p:spPr>
+          <a:xfrm>
+            <a:off x="5198425" y="2271655"/>
+            <a:ext cx="2295451" cy="646331"/>
+          </a:xfrm>
+          <a:prstGeom prst="rect">
+            <a:avLst/>
+          </a:prstGeom>
+          <a:noFill/>
+        </p:spPr>
+        <p:txBody>
+          <a:bodyPr wrap="square" rtlCol="0">
+            <a:spAutoFit/>
+          </a:bodyPr>
+          <a:lstStyle/>
+          <a:p>
+            <a:r>
+              <a:rPr lang="en-US" sz="3600" dirty="0">
+                <a:solidFill>
+                  <a:schemeClr val="accent1"/>
+                </a:solidFill>
+              </a:rPr>
+              <a:t>Loading…</a:t>
+            </a:r>
+          </a:p>
+        </p:txBody>
+      </p:sp>
+    </p:spTree>
+    <p:extLst>
+      <p:ext uri="{BB962C8B-B14F-4D97-AF65-F5344CB8AC3E}">
+        <p14:creationId xmlns:p14="http://schemas.microsoft.com/office/powerpoint/2010/main" val="738528049"/>
+      </p:ext>
+    </p:extLst>
+  </p:cSld>
+  <p:clrMapOvr>
+    <a:masterClrMapping/>
+  </p:clrMapOvr>
+</p:sld>
+</file>
+
 <file path=ppt/theme/theme1.xml><?xml version="1.0" encoding="utf-8"?>
 <a:theme xmlns:a="http://schemas.openxmlformats.org/drawingml/2006/main" name="Office Theme">
   <a:themeElements>

</xml_diff>

<commit_message>
re #5 -- first pass
</commit_message>
<xml_diff>
--- a/src/assets/graphics.pptx
+++ b/src/assets/graphics.pptx
@@ -260,7 +260,7 @@
           <a:p>
             <a:fld id="{53F0AC85-51B6-E44A-8F4A-F07DD4B8EC8E}" type="datetimeFigureOut">
               <a:rPr lang="en-US" smtClean="0"/>
-              <a:t>4/29/22</a:t>
+              <a:t>5/2/22</a:t>
             </a:fld>
             <a:endParaRPr lang="en-US"/>
           </a:p>
@@ -458,7 +458,7 @@
           <a:p>
             <a:fld id="{53F0AC85-51B6-E44A-8F4A-F07DD4B8EC8E}" type="datetimeFigureOut">
               <a:rPr lang="en-US" smtClean="0"/>
-              <a:t>4/29/22</a:t>
+              <a:t>5/2/22</a:t>
             </a:fld>
             <a:endParaRPr lang="en-US"/>
           </a:p>
@@ -666,7 +666,7 @@
           <a:p>
             <a:fld id="{53F0AC85-51B6-E44A-8F4A-F07DD4B8EC8E}" type="datetimeFigureOut">
               <a:rPr lang="en-US" smtClean="0"/>
-              <a:t>4/29/22</a:t>
+              <a:t>5/2/22</a:t>
             </a:fld>
             <a:endParaRPr lang="en-US"/>
           </a:p>
@@ -864,7 +864,7 @@
           <a:p>
             <a:fld id="{53F0AC85-51B6-E44A-8F4A-F07DD4B8EC8E}" type="datetimeFigureOut">
               <a:rPr lang="en-US" smtClean="0"/>
-              <a:t>4/29/22</a:t>
+              <a:t>5/2/22</a:t>
             </a:fld>
             <a:endParaRPr lang="en-US"/>
           </a:p>
@@ -1139,7 +1139,7 @@
           <a:p>
             <a:fld id="{53F0AC85-51B6-E44A-8F4A-F07DD4B8EC8E}" type="datetimeFigureOut">
               <a:rPr lang="en-US" smtClean="0"/>
-              <a:t>4/29/22</a:t>
+              <a:t>5/2/22</a:t>
             </a:fld>
             <a:endParaRPr lang="en-US"/>
           </a:p>
@@ -1404,7 +1404,7 @@
           <a:p>
             <a:fld id="{53F0AC85-51B6-E44A-8F4A-F07DD4B8EC8E}" type="datetimeFigureOut">
               <a:rPr lang="en-US" smtClean="0"/>
-              <a:t>4/29/22</a:t>
+              <a:t>5/2/22</a:t>
             </a:fld>
             <a:endParaRPr lang="en-US"/>
           </a:p>
@@ -1816,7 +1816,7 @@
           <a:p>
             <a:fld id="{53F0AC85-51B6-E44A-8F4A-F07DD4B8EC8E}" type="datetimeFigureOut">
               <a:rPr lang="en-US" smtClean="0"/>
-              <a:t>4/29/22</a:t>
+              <a:t>5/2/22</a:t>
             </a:fld>
             <a:endParaRPr lang="en-US"/>
           </a:p>
@@ -1957,7 +1957,7 @@
           <a:p>
             <a:fld id="{53F0AC85-51B6-E44A-8F4A-F07DD4B8EC8E}" type="datetimeFigureOut">
               <a:rPr lang="en-US" smtClean="0"/>
-              <a:t>4/29/22</a:t>
+              <a:t>5/2/22</a:t>
             </a:fld>
             <a:endParaRPr lang="en-US"/>
           </a:p>
@@ -2070,7 +2070,7 @@
           <a:p>
             <a:fld id="{53F0AC85-51B6-E44A-8F4A-F07DD4B8EC8E}" type="datetimeFigureOut">
               <a:rPr lang="en-US" smtClean="0"/>
-              <a:t>4/29/22</a:t>
+              <a:t>5/2/22</a:t>
             </a:fld>
             <a:endParaRPr lang="en-US"/>
           </a:p>
@@ -2381,7 +2381,7 @@
           <a:p>
             <a:fld id="{53F0AC85-51B6-E44A-8F4A-F07DD4B8EC8E}" type="datetimeFigureOut">
               <a:rPr lang="en-US" smtClean="0"/>
-              <a:t>4/29/22</a:t>
+              <a:t>5/2/22</a:t>
             </a:fld>
             <a:endParaRPr lang="en-US"/>
           </a:p>
@@ -2669,7 +2669,7 @@
           <a:p>
             <a:fld id="{53F0AC85-51B6-E44A-8F4A-F07DD4B8EC8E}" type="datetimeFigureOut">
               <a:rPr lang="en-US" smtClean="0"/>
-              <a:t>4/29/22</a:t>
+              <a:t>5/2/22</a:t>
             </a:fld>
             <a:endParaRPr lang="en-US"/>
           </a:p>
@@ -2910,7 +2910,7 @@
           <a:p>
             <a:fld id="{53F0AC85-51B6-E44A-8F4A-F07DD4B8EC8E}" type="datetimeFigureOut">
               <a:rPr lang="en-US" smtClean="0"/>
-              <a:t>4/29/22</a:t>
+              <a:t>5/2/22</a:t>
             </a:fld>
             <a:endParaRPr lang="en-US"/>
           </a:p>
@@ -4077,110 +4077,6 @@
           <a:chExt cx="0" cy="0"/>
         </a:xfrm>
       </p:grpSpPr>
-      <p:sp>
-        <p:nvSpPr>
-          <p:cNvPr id="4" name="Rectangle 3">
-            <a:extLst>
-              <a:ext uri="{FF2B5EF4-FFF2-40B4-BE49-F238E27FC236}">
-                <a16:creationId xmlns:a16="http://schemas.microsoft.com/office/drawing/2014/main" id="{F31DE79E-6F01-9D4E-A22E-7E785354E889}"/>
-              </a:ext>
-            </a:extLst>
-          </p:cNvPr>
-          <p:cNvSpPr/>
-          <p:nvPr/>
-        </p:nvSpPr>
-        <p:spPr>
-          <a:xfrm>
-            <a:off x="3324285" y="1774070"/>
-            <a:ext cx="1800000" cy="1800000"/>
-          </a:xfrm>
-          <a:prstGeom prst="rect">
-            <a:avLst/>
-          </a:prstGeom>
-          <a:noFill/>
-          <a:ln w="63500">
-            <a:solidFill>
-              <a:schemeClr val="tx1"/>
-            </a:solidFill>
-          </a:ln>
-        </p:spPr>
-        <p:style>
-          <a:lnRef idx="2">
-            <a:schemeClr val="accent1">
-              <a:shade val="50000"/>
-            </a:schemeClr>
-          </a:lnRef>
-          <a:fillRef idx="1">
-            <a:schemeClr val="accent1"/>
-          </a:fillRef>
-          <a:effectRef idx="0">
-            <a:schemeClr val="accent1"/>
-          </a:effectRef>
-          <a:fontRef idx="minor">
-            <a:schemeClr val="lt1"/>
-          </a:fontRef>
-        </p:style>
-        <p:txBody>
-          <a:bodyPr rtlCol="0" anchor="ctr"/>
-          <a:lstStyle/>
-          <a:p>
-            <a:pPr algn="ctr"/>
-            <a:endParaRPr lang="en-US"/>
-          </a:p>
-        </p:txBody>
-      </p:sp>
-      <p:sp>
-        <p:nvSpPr>
-          <p:cNvPr id="5" name="Oval 4">
-            <a:extLst>
-              <a:ext uri="{FF2B5EF4-FFF2-40B4-BE49-F238E27FC236}">
-                <a16:creationId xmlns:a16="http://schemas.microsoft.com/office/drawing/2014/main" id="{FBD2ECA8-B2BA-7D41-813E-8D5D3D837C5B}"/>
-              </a:ext>
-            </a:extLst>
-          </p:cNvPr>
-          <p:cNvSpPr/>
-          <p:nvPr/>
-        </p:nvSpPr>
-        <p:spPr>
-          <a:xfrm>
-            <a:off x="3504285" y="1954070"/>
-            <a:ext cx="1440000" cy="1440000"/>
-          </a:xfrm>
-          <a:prstGeom prst="ellipse">
-            <a:avLst/>
-          </a:prstGeom>
-          <a:noFill/>
-          <a:ln w="25400">
-            <a:solidFill>
-              <a:schemeClr val="tx1"/>
-            </a:solidFill>
-          </a:ln>
-        </p:spPr>
-        <p:style>
-          <a:lnRef idx="2">
-            <a:schemeClr val="accent1">
-              <a:shade val="50000"/>
-            </a:schemeClr>
-          </a:lnRef>
-          <a:fillRef idx="1">
-            <a:schemeClr val="accent1"/>
-          </a:fillRef>
-          <a:effectRef idx="0">
-            <a:schemeClr val="accent1"/>
-          </a:effectRef>
-          <a:fontRef idx="minor">
-            <a:schemeClr val="lt1"/>
-          </a:fontRef>
-        </p:style>
-        <p:txBody>
-          <a:bodyPr rtlCol="0" anchor="ctr"/>
-          <a:lstStyle/>
-          <a:p>
-            <a:pPr algn="ctr"/>
-            <a:endParaRPr lang="en-US"/>
-          </a:p>
-        </p:txBody>
-      </p:sp>
       <p:pic>
         <p:nvPicPr>
           <p:cNvPr id="6" name="Graphic 5" descr="Leaf with solid fill">
@@ -4209,8 +4105,8 @@
         </p:blipFill>
         <p:spPr>
           <a:xfrm>
-            <a:off x="3578425" y="2259299"/>
-            <a:ext cx="767571" cy="767571"/>
+            <a:off x="3681989" y="1860331"/>
+            <a:ext cx="1568669" cy="1568669"/>
           </a:xfrm>
           <a:prstGeom prst="rect">
             <a:avLst/>
@@ -4219,10 +4115,10 @@
       </p:pic>
       <p:pic>
         <p:nvPicPr>
-          <p:cNvPr id="7" name="Graphic 6" descr="Leaf with solid fill">
-            <a:extLst>
-              <a:ext uri="{FF2B5EF4-FFF2-40B4-BE49-F238E27FC236}">
-                <a16:creationId xmlns:a16="http://schemas.microsoft.com/office/drawing/2014/main" id="{FE97B762-84E0-824D-A9F4-719D89D5B3F2}"/>
+          <p:cNvPr id="3" name="Graphic 2" descr="Ruler with solid fill">
+            <a:extLst>
+              <a:ext uri="{FF2B5EF4-FFF2-40B4-BE49-F238E27FC236}">
+                <a16:creationId xmlns:a16="http://schemas.microsoft.com/office/drawing/2014/main" id="{3754B553-BB9C-FB4D-BB67-C8ADC5E77DD1}"/>
               </a:ext>
             </a:extLst>
           </p:cNvPr>
@@ -4232,10 +4128,10 @@
           <p:nvPr/>
         </p:nvPicPr>
         <p:blipFill>
-          <a:blip r:embed="rId2">
+          <a:blip r:embed="rId4">
             <a:extLst>
               <a:ext uri="{96DAC541-7B7A-43D3-8B79-37D633B846F1}">
-                <asvg:svgBlip xmlns:asvg="http://schemas.microsoft.com/office/drawing/2016/SVG/main" r:embed="rId3"/>
+                <asvg:svgBlip xmlns:asvg="http://schemas.microsoft.com/office/drawing/2016/SVG/main" r:embed="rId5"/>
               </a:ext>
             </a:extLst>
           </a:blip>
@@ -4244,54 +4140,15 @@
           </a:stretch>
         </p:blipFill>
         <p:spPr>
-          <a:xfrm>
-            <a:off x="4109765" y="2271655"/>
-            <a:ext cx="767571" cy="767571"/>
+          <a:xfrm rot="8035571">
+            <a:off x="4662052" y="2046964"/>
+            <a:ext cx="1195400" cy="1195400"/>
           </a:xfrm>
           <a:prstGeom prst="rect">
             <a:avLst/>
           </a:prstGeom>
         </p:spPr>
       </p:pic>
-      <p:sp>
-        <p:nvSpPr>
-          <p:cNvPr id="8" name="TextBox 7">
-            <a:extLst>
-              <a:ext uri="{FF2B5EF4-FFF2-40B4-BE49-F238E27FC236}">
-                <a16:creationId xmlns:a16="http://schemas.microsoft.com/office/drawing/2014/main" id="{919E926C-65BA-4F48-A560-81F52DA69DA6}"/>
-              </a:ext>
-            </a:extLst>
-          </p:cNvPr>
-          <p:cNvSpPr txBox="1"/>
-          <p:nvPr/>
-        </p:nvSpPr>
-        <p:spPr>
-          <a:xfrm>
-            <a:off x="5198425" y="2271655"/>
-            <a:ext cx="2295451" cy="646331"/>
-          </a:xfrm>
-          <a:prstGeom prst="rect">
-            <a:avLst/>
-          </a:prstGeom>
-          <a:noFill/>
-        </p:spPr>
-        <p:txBody>
-          <a:bodyPr wrap="square" rtlCol="0">
-            <a:spAutoFit/>
-          </a:bodyPr>
-          <a:lstStyle/>
-          <a:p>
-            <a:r>
-              <a:rPr lang="en-US" sz="3600" dirty="0">
-                <a:solidFill>
-                  <a:schemeClr val="accent1"/>
-                </a:solidFill>
-              </a:rPr>
-              <a:t>Loading…</a:t>
-            </a:r>
-          </a:p>
-        </p:txBody>
-      </p:sp>
     </p:spTree>
     <p:extLst>
       <p:ext uri="{BB962C8B-B14F-4D97-AF65-F5344CB8AC3E}">

</xml_diff>